<commit_message>
clean does not mean clean
</commit_message>
<xml_diff>
--- a/documents/analytics-service.pptx
+++ b/documents/analytics-service.pptx
@@ -250,7 +250,7 @@
           <a:p>
             <a:fld id="{0A9F5385-F934-4948-A3AA-DB68C3919D5E}" type="datetimeFigureOut">
               <a:rPr lang="en-US" smtClean="0"/>
-              <a:t>7/28/2022</a:t>
+              <a:t>10/5/22</a:t>
             </a:fld>
             <a:endParaRPr lang="en-US"/>
           </a:p>
@@ -418,7 +418,7 @@
           <a:p>
             <a:fld id="{0A9F5385-F934-4948-A3AA-DB68C3919D5E}" type="datetimeFigureOut">
               <a:rPr lang="en-US" smtClean="0"/>
-              <a:t>7/28/2022</a:t>
+              <a:t>10/5/22</a:t>
             </a:fld>
             <a:endParaRPr lang="en-US"/>
           </a:p>
@@ -596,7 +596,7 @@
           <a:p>
             <a:fld id="{0A9F5385-F934-4948-A3AA-DB68C3919D5E}" type="datetimeFigureOut">
               <a:rPr lang="en-US" smtClean="0"/>
-              <a:t>7/28/2022</a:t>
+              <a:t>10/5/22</a:t>
             </a:fld>
             <a:endParaRPr lang="en-US"/>
           </a:p>
@@ -764,7 +764,7 @@
           <a:p>
             <a:fld id="{0A9F5385-F934-4948-A3AA-DB68C3919D5E}" type="datetimeFigureOut">
               <a:rPr lang="en-US" smtClean="0"/>
-              <a:t>7/28/2022</a:t>
+              <a:t>10/5/22</a:t>
             </a:fld>
             <a:endParaRPr lang="en-US"/>
           </a:p>
@@ -1009,7 +1009,7 @@
           <a:p>
             <a:fld id="{0A9F5385-F934-4948-A3AA-DB68C3919D5E}" type="datetimeFigureOut">
               <a:rPr lang="en-US" smtClean="0"/>
-              <a:t>7/28/2022</a:t>
+              <a:t>10/5/22</a:t>
             </a:fld>
             <a:endParaRPr lang="en-US"/>
           </a:p>
@@ -1238,7 +1238,7 @@
           <a:p>
             <a:fld id="{0A9F5385-F934-4948-A3AA-DB68C3919D5E}" type="datetimeFigureOut">
               <a:rPr lang="en-US" smtClean="0"/>
-              <a:t>7/28/2022</a:t>
+              <a:t>10/5/22</a:t>
             </a:fld>
             <a:endParaRPr lang="en-US"/>
           </a:p>
@@ -1602,7 +1602,7 @@
           <a:p>
             <a:fld id="{0A9F5385-F934-4948-A3AA-DB68C3919D5E}" type="datetimeFigureOut">
               <a:rPr lang="en-US" smtClean="0"/>
-              <a:t>7/28/2022</a:t>
+              <a:t>10/5/22</a:t>
             </a:fld>
             <a:endParaRPr lang="en-US"/>
           </a:p>
@@ -1719,7 +1719,7 @@
           <a:p>
             <a:fld id="{0A9F5385-F934-4948-A3AA-DB68C3919D5E}" type="datetimeFigureOut">
               <a:rPr lang="en-US" smtClean="0"/>
-              <a:t>7/28/2022</a:t>
+              <a:t>10/5/22</a:t>
             </a:fld>
             <a:endParaRPr lang="en-US"/>
           </a:p>
@@ -1814,7 +1814,7 @@
           <a:p>
             <a:fld id="{0A9F5385-F934-4948-A3AA-DB68C3919D5E}" type="datetimeFigureOut">
               <a:rPr lang="en-US" smtClean="0"/>
-              <a:t>7/28/2022</a:t>
+              <a:t>10/5/22</a:t>
             </a:fld>
             <a:endParaRPr lang="en-US"/>
           </a:p>
@@ -2089,7 +2089,7 @@
           <a:p>
             <a:fld id="{0A9F5385-F934-4948-A3AA-DB68C3919D5E}" type="datetimeFigureOut">
               <a:rPr lang="en-US" smtClean="0"/>
-              <a:t>7/28/2022</a:t>
+              <a:t>10/5/22</a:t>
             </a:fld>
             <a:endParaRPr lang="en-US"/>
           </a:p>
@@ -2341,7 +2341,7 @@
           <a:p>
             <a:fld id="{0A9F5385-F934-4948-A3AA-DB68C3919D5E}" type="datetimeFigureOut">
               <a:rPr lang="en-US" smtClean="0"/>
-              <a:t>7/28/2022</a:t>
+              <a:t>10/5/22</a:t>
             </a:fld>
             <a:endParaRPr lang="en-US"/>
           </a:p>
@@ -2552,7 +2552,7 @@
           <a:p>
             <a:fld id="{0A9F5385-F934-4948-A3AA-DB68C3919D5E}" type="datetimeFigureOut">
               <a:rPr lang="en-US" smtClean="0"/>
-              <a:t>7/28/2022</a:t>
+              <a:t>10/5/22</a:t>
             </a:fld>
             <a:endParaRPr lang="en-US"/>
           </a:p>
@@ -3000,9 +3000,18 @@
                 </a:solidFill>
                 <a:latin typeface="ITC Franklin Gothic Std Demi Condensed"/>
               </a:rPr>
-              <a:t>Hybrid Multi-Cloud Analytics Services Framework</a:t>
-            </a:r>
-            <a:endParaRPr lang="en-US" sz="4400">
+              <a:t>Hybrid </a:t>
+            </a:r>
+            <a:r>
+              <a:rPr lang="en-US" sz="4400" b="1" dirty="0">
+                <a:solidFill>
+                  <a:schemeClr val="bg1"/>
+                </a:solidFill>
+                <a:latin typeface="ITC Franklin Gothic Std Demi Condensed"/>
+              </a:rPr>
+              <a:t>Multi-Cloud Analytics Services Framework</a:t>
+            </a:r>
+            <a:endParaRPr lang="en-US" sz="4400" dirty="0">
               <a:solidFill>
                 <a:schemeClr val="bg1"/>
               </a:solidFill>
@@ -3058,8 +3067,8 @@
         </p:nvSpPr>
         <p:spPr>
           <a:xfrm>
-            <a:off x="1279074" y="3498448"/>
-            <a:ext cx="8645976" cy="738664"/>
+            <a:off x="1365812" y="3498448"/>
+            <a:ext cx="15023939" cy="738664"/>
           </a:xfrm>
           <a:prstGeom prst="rect">
             <a:avLst/>
@@ -3073,69 +3082,78 @@
           <a:lstStyle/>
           <a:p>
             <a:r>
+              <a:rPr lang="en-US" sz="2100" b="1" dirty="0">
+                <a:ea typeface="+mn-lt"/>
+                <a:cs typeface="+mn-lt"/>
+              </a:rPr>
+              <a:t>Gregor von Laszewski</a:t>
+            </a:r>
+            <a:r>
+              <a:rPr lang="en-US" sz="2100" b="1" baseline="30000" dirty="0">
+                <a:ea typeface="+mn-lt"/>
+                <a:cs typeface="+mn-lt"/>
+              </a:rPr>
+              <a:t>1</a:t>
+            </a:r>
+            <a:r>
+              <a:rPr lang="en-US" sz="2100" b="1" dirty="0">
+                <a:ea typeface="+mn-lt"/>
+                <a:cs typeface="+mn-lt"/>
+              </a:rPr>
+              <a:t>, JP Fleischer</a:t>
+            </a:r>
+            <a:r>
+              <a:rPr lang="en-US" sz="2100" b="1" baseline="30000" dirty="0">
+                <a:ea typeface="+mn-lt"/>
+                <a:cs typeface="+mn-lt"/>
+              </a:rPr>
+              <a:t>1   </a:t>
+            </a:r>
+            <a:r>
+              <a:rPr lang="en-US" sz="1600" b="1" baseline="30000" dirty="0">
+                <a:ea typeface="+mn-lt"/>
+                <a:cs typeface="+mn-lt"/>
+              </a:rPr>
+              <a:t>  </a:t>
+            </a:r>
+            <a:r>
+              <a:rPr lang="en-US" sz="1600" dirty="0">
+                <a:ea typeface="+mn-lt"/>
+                <a:cs typeface="+mn-lt"/>
+              </a:rPr>
+              <a:t>with contributions to the pre-alpha version from </a:t>
+            </a:r>
+            <a:r>
+              <a:rPr lang="en-US" sz="1600" i="1" dirty="0">
+                <a:ea typeface="+mn-lt"/>
+                <a:cs typeface="+mn-lt"/>
+              </a:rPr>
+              <a:t>Jackson </a:t>
+            </a:r>
+            <a:r>
+              <a:rPr lang="en-US" sz="1600" i="1" dirty="0" err="1">
+                <a:ea typeface="+mn-lt"/>
+                <a:cs typeface="+mn-lt"/>
+              </a:rPr>
+              <a:t>Miskill</a:t>
+            </a:r>
+            <a:r>
+              <a:rPr lang="en-US" sz="1600" i="1" dirty="0">
+                <a:ea typeface="+mn-lt"/>
+                <a:cs typeface="+mn-lt"/>
+              </a:rPr>
+              <a:t>, Alison Lu, Alex Beck</a:t>
+            </a:r>
+          </a:p>
+          <a:p>
+            <a:r>
               <a:rPr lang="en-US" sz="2100" dirty="0">
                 <a:ea typeface="+mn-lt"/>
                 <a:cs typeface="+mn-lt"/>
               </a:rPr>
-              <a:t>Alison Lu, Jackson </a:t>
-            </a:r>
-            <a:r>
-              <a:rPr lang="en-US" sz="2100" dirty="0" err="1">
-                <a:ea typeface="+mn-lt"/>
-                <a:cs typeface="+mn-lt"/>
-              </a:rPr>
-              <a:t>Miskill</a:t>
-            </a:r>
-            <a:r>
-              <a:rPr lang="en-US" sz="2100" dirty="0">
-                <a:ea typeface="+mn-lt"/>
-                <a:cs typeface="+mn-lt"/>
-              </a:rPr>
-              <a:t>, Alex Beck, JP Fleischer, Gregor von Laszewski</a:t>
-            </a:r>
-            <a:endParaRPr lang="en-US" dirty="0"/>
-          </a:p>
-          <a:p>
-            <a:endParaRPr lang="en-US" sz="2100" dirty="0">
-              <a:solidFill>
-                <a:srgbClr val="20304B"/>
-              </a:solidFill>
-              <a:latin typeface="ITC Franklin Gothic Std Book"/>
-              <a:cs typeface="Calibri"/>
-            </a:endParaRPr>
-          </a:p>
-        </p:txBody>
-      </p:sp>
-      <p:sp>
-        <p:nvSpPr>
-          <p:cNvPr id="18" name="TextBox 17"/>
-          <p:cNvSpPr txBox="1"/>
-          <p:nvPr/>
-        </p:nvSpPr>
-        <p:spPr>
-          <a:xfrm>
-            <a:off x="1251039" y="3828798"/>
-            <a:ext cx="13377303" cy="415498"/>
-          </a:xfrm>
-          <a:prstGeom prst="rect">
-            <a:avLst/>
-          </a:prstGeom>
-          <a:noFill/>
-        </p:spPr>
-        <p:txBody>
-          <a:bodyPr wrap="square" lIns="91440" tIns="45720" rIns="91440" bIns="45720" rtlCol="0" anchor="t">
-            <a:spAutoFit/>
-          </a:bodyPr>
-          <a:lstStyle/>
-          <a:p>
-            <a:r>
-              <a:rPr lang="en-US" sz="2100">
-                <a:ea typeface="+mn-lt"/>
-                <a:cs typeface="+mn-lt"/>
-              </a:rPr>
               <a:t>University of Virginia Biocomplexity Institute - Network System Sciences and Advanced Computing Division</a:t>
             </a:r>
-            <a:endParaRPr lang="en-US"/>
+            <a:endParaRPr lang="en-US" sz="2400" dirty="0"/>
           </a:p>
         </p:txBody>
       </p:sp>
@@ -3209,7 +3227,7 @@
         </p:nvSpPr>
         <p:spPr>
           <a:xfrm>
-            <a:off x="181946" y="25738234"/>
+            <a:off x="253574" y="26376702"/>
             <a:ext cx="10353491" cy="2123658"/>
           </a:xfrm>
           <a:prstGeom prst="rect">
@@ -3224,7 +3242,7 @@
           <a:lstStyle/>
           <a:p>
             <a:r>
-              <a:rPr lang="en-US" sz="2400" b="1" err="1">
+              <a:rPr lang="en-US" sz="2400" b="1" dirty="0" err="1">
                 <a:solidFill>
                   <a:srgbClr val="20304B"/>
                 </a:solidFill>
@@ -3235,7 +3253,7 @@
               <a:t>Cloudmesh</a:t>
             </a:r>
             <a:r>
-              <a:rPr lang="en-US" sz="2400" b="1">
+              <a:rPr lang="en-US" sz="2400" b="1" dirty="0">
                 <a:solidFill>
                   <a:srgbClr val="20304B"/>
                 </a:solidFill>
@@ -3243,11 +3261,11 @@
                 <a:ea typeface="ITC Franklin Gothic Std Demi" charset="0"/>
                 <a:cs typeface="ITC Franklin Gothic Std Demi" charset="0"/>
               </a:rPr>
-              <a:t>: Code Used / Developed</a:t>
-            </a:r>
-          </a:p>
-          <a:p>
-            <a:endParaRPr lang="en-US" sz="1800" b="1">
+              <a:t> References</a:t>
+            </a:r>
+          </a:p>
+          <a:p>
+            <a:endParaRPr lang="en-US" sz="1800" b="1" dirty="0">
               <a:solidFill>
                 <a:srgbClr val="20304B"/>
               </a:solidFill>
@@ -3262,34 +3280,20 @@
               <a:buChar char="•"/>
             </a:pPr>
             <a:r>
-              <a:rPr lang="en-US" sz="1800" err="1">
+              <a:rPr lang="en-US" sz="1800" dirty="0">
                 <a:latin typeface="Franklin Gothic Book" panose="020B0503020102020204" pitchFamily="34" charset="0"/>
                 <a:hlinkClick r:id="rId3"/>
               </a:rPr>
-              <a:t>cloudmesh</a:t>
-            </a:r>
-            <a:r>
-              <a:rPr lang="en-US" sz="1800">
+              <a:t>cloudmesh/cloudmesh-cc</a:t>
+            </a:r>
+            <a:r>
+              <a:rPr lang="en-US" sz="1800" dirty="0">
                 <a:latin typeface="Franklin Gothic Book" panose="020B0503020102020204" pitchFamily="34" charset="0"/>
                 <a:hlinkClick r:id="rId3"/>
               </a:rPr>
-              <a:t>/</a:t>
-            </a:r>
-            <a:r>
-              <a:rPr lang="en-US" sz="1800" err="1">
-                <a:latin typeface="Franklin Gothic Book" panose="020B0503020102020204" pitchFamily="34" charset="0"/>
-                <a:hlinkClick r:id="rId3"/>
-              </a:rPr>
-              <a:t>cloudmesh</a:t>
-            </a:r>
-            <a:r>
-              <a:rPr lang="en-US" sz="1800">
-                <a:latin typeface="Franklin Gothic Book" panose="020B0503020102020204" pitchFamily="34" charset="0"/>
-                <a:hlinkClick r:id="rId3"/>
-              </a:rPr>
-              <a:t>-cc (github.com)</a:t>
-            </a:r>
-            <a:endParaRPr lang="en-US" sz="1800" b="1">
+              <a:t> (github.com)</a:t>
+            </a:r>
+            <a:endParaRPr lang="en-US" sz="1800" b="1" dirty="0">
               <a:solidFill>
                 <a:srgbClr val="20304B"/>
               </a:solidFill>
@@ -3304,48 +3308,13 @@
               <a:buChar char="•"/>
             </a:pPr>
             <a:r>
-              <a:rPr lang="en-US" sz="1800" err="1">
+              <a:rPr lang="en-US" sz="1800" dirty="0">
                 <a:latin typeface="Franklin Gothic Book" panose="020B0503020102020204" pitchFamily="34" charset="0"/>
                 <a:hlinkClick r:id="rId4"/>
               </a:rPr>
-              <a:t>cloudmesh</a:t>
-            </a:r>
-            <a:r>
-              <a:rPr lang="en-US" sz="1800">
-                <a:latin typeface="Franklin Gothic Book" panose="020B0503020102020204" pitchFamily="34" charset="0"/>
-                <a:hlinkClick r:id="rId4"/>
-              </a:rPr>
-              <a:t>/</a:t>
-            </a:r>
-            <a:r>
-              <a:rPr lang="en-US" sz="1800" err="1">
-                <a:latin typeface="Franklin Gothic Book" panose="020B0503020102020204" pitchFamily="34" charset="0"/>
-                <a:hlinkClick r:id="rId4"/>
-              </a:rPr>
-              <a:t>cloudmesh</a:t>
-            </a:r>
-            <a:r>
-              <a:rPr lang="en-US" sz="1800">
-                <a:latin typeface="Franklin Gothic Book" panose="020B0503020102020204" pitchFamily="34" charset="0"/>
-                <a:hlinkClick r:id="rId4"/>
-              </a:rPr>
-              <a:t>-common: Common methods that make programming in python easier and used in </a:t>
-            </a:r>
-            <a:r>
-              <a:rPr lang="en-US" sz="1800" err="1">
-                <a:latin typeface="Franklin Gothic Book" panose="020B0503020102020204" pitchFamily="34" charset="0"/>
-                <a:hlinkClick r:id="rId4"/>
-              </a:rPr>
-              <a:t>cloudmesh</a:t>
-            </a:r>
-            <a:r>
-              <a:rPr lang="en-US" sz="1800">
-                <a:latin typeface="Franklin Gothic Book" panose="020B0503020102020204" pitchFamily="34" charset="0"/>
-                <a:hlinkClick r:id="rId4"/>
-              </a:rPr>
-              <a:t> (github.com)</a:t>
-            </a:r>
-            <a:endParaRPr lang="en-US" sz="1800">
+              <a:t>cloudmesh/cloudmesh-common: Common methods that make programming in python easier and used in cloudmesh (github.com)</a:t>
+            </a:r>
+            <a:endParaRPr lang="en-US" sz="1800" dirty="0">
               <a:latin typeface="Franklin Gothic Book" panose="020B0503020102020204" pitchFamily="34" charset="0"/>
             </a:endParaRPr>
           </a:p>
@@ -3355,34 +3324,13 @@
               <a:buChar char="•"/>
             </a:pPr>
             <a:r>
-              <a:rPr lang="en-US" sz="1800" err="1">
+              <a:rPr lang="en-US" sz="1800" dirty="0">
                 <a:latin typeface="Franklin Gothic Book" panose="020B0503020102020204" pitchFamily="34" charset="0"/>
                 <a:hlinkClick r:id="rId5"/>
               </a:rPr>
-              <a:t>cloudmesh</a:t>
-            </a:r>
-            <a:r>
-              <a:rPr lang="en-US" sz="1800">
-                <a:latin typeface="Franklin Gothic Book" panose="020B0503020102020204" pitchFamily="34" charset="0"/>
-                <a:hlinkClick r:id="rId5"/>
-              </a:rPr>
-              <a:t>/</a:t>
-            </a:r>
-            <a:r>
-              <a:rPr lang="en-US" sz="1800" err="1">
-                <a:latin typeface="Franklin Gothic Book" panose="020B0503020102020204" pitchFamily="34" charset="0"/>
-                <a:hlinkClick r:id="rId5"/>
-              </a:rPr>
-              <a:t>cloudmesh-vpn</a:t>
-            </a:r>
-            <a:r>
-              <a:rPr lang="en-US" sz="1800">
-                <a:latin typeface="Franklin Gothic Book" panose="020B0503020102020204" pitchFamily="34" charset="0"/>
-                <a:hlinkClick r:id="rId5"/>
-              </a:rPr>
-              <a:t> (github.com)</a:t>
-            </a:r>
-            <a:endParaRPr lang="en-US" sz="1800" b="1">
+              <a:t>cloudmesh/cloudmesh-vpn (github.com)</a:t>
+            </a:r>
+            <a:endParaRPr lang="en-US" sz="1800" b="1" dirty="0">
               <a:solidFill>
                 <a:srgbClr val="20304B"/>
               </a:solidFill>
@@ -3395,20 +3343,13 @@
               <a:buChar char="•"/>
             </a:pPr>
             <a:r>
-              <a:rPr lang="en-US" sz="1800" err="1">
+              <a:rPr lang="en-US" sz="1800" dirty="0">
                 <a:latin typeface="Franklin Gothic Book" panose="020B0503020102020204" pitchFamily="34" charset="0"/>
                 <a:hlinkClick r:id="rId6"/>
               </a:rPr>
-              <a:t>cybertraining-dsc</a:t>
-            </a:r>
-            <a:r>
-              <a:rPr lang="en-US" sz="1800">
-                <a:latin typeface="Franklin Gothic Book" panose="020B0503020102020204" pitchFamily="34" charset="0"/>
-                <a:hlinkClick r:id="rId6"/>
-              </a:rPr>
-              <a:t>/reu2022 (github.com)</a:t>
-            </a:r>
-            <a:endParaRPr lang="en-US" sz="1800" b="1">
+              <a:t>cybertraining-dsc/reu2022 (github.com)</a:t>
+            </a:r>
+            <a:endParaRPr lang="en-US" sz="1800" b="1" dirty="0">
               <a:solidFill>
                 <a:srgbClr val="20304B"/>
               </a:solidFill>
@@ -3427,8 +3368,8 @@
         </p:nvSpPr>
         <p:spPr>
           <a:xfrm>
-            <a:off x="-256296" y="24680689"/>
-            <a:ext cx="5384800" cy="523220"/>
+            <a:off x="30613" y="24273248"/>
+            <a:ext cx="4835100" cy="769441"/>
           </a:xfrm>
           <a:prstGeom prst="rect">
             <a:avLst/>
@@ -3441,9 +3382,8 @@
           </a:bodyPr>
           <a:lstStyle/>
           <a:p>
-            <a:pPr algn="ctr"/>
-            <a:r>
-              <a:rPr lang="en-US" sz="2800" b="1" i="1">
+            <a:r>
+              <a:rPr lang="en-US" sz="2200" b="1" i="1" dirty="0">
                 <a:solidFill>
                   <a:schemeClr val="tx1">
                     <a:lumMod val="65000"/>
@@ -3452,7 +3392,31 @@
                 </a:solidFill>
                 <a:latin typeface="Bodoni Std Poster"/>
               </a:rPr>
-              <a:t>Fig 1. Sample Workflow</a:t>
+              <a:t>Fig. 1. Execution of a </a:t>
+            </a:r>
+            <a:r>
+              <a:rPr lang="en-US" sz="2200" b="1" i="1" dirty="0" err="1">
+                <a:solidFill>
+                  <a:schemeClr val="tx1">
+                    <a:lumMod val="65000"/>
+                    <a:lumOff val="35000"/>
+                  </a:schemeClr>
+                </a:solidFill>
+                <a:latin typeface="Bodoni Std Poster"/>
+              </a:rPr>
+              <a:t>Cloudmesh</a:t>
+            </a:r>
+            <a:r>
+              <a:rPr lang="en-US" sz="2200" b="1" i="1" dirty="0">
+                <a:solidFill>
+                  <a:schemeClr val="tx1">
+                    <a:lumMod val="65000"/>
+                    <a:lumOff val="35000"/>
+                  </a:schemeClr>
+                </a:solidFill>
+                <a:latin typeface="Bodoni Std Poster"/>
+              </a:rPr>
+              <a:t> cc Workflow with display</a:t>
             </a:r>
           </a:p>
         </p:txBody>
@@ -3465,8 +3429,8 @@
         </p:nvSpPr>
         <p:spPr>
           <a:xfrm>
-            <a:off x="4712715" y="24305113"/>
-            <a:ext cx="5452915" cy="523220"/>
+            <a:off x="4967416" y="24305113"/>
+            <a:ext cx="5198214" cy="769441"/>
           </a:xfrm>
           <a:prstGeom prst="rect">
             <a:avLst/>
@@ -3479,9 +3443,8 @@
           </a:bodyPr>
           <a:lstStyle/>
           <a:p>
-            <a:pPr algn="ctr"/>
-            <a:r>
-              <a:rPr lang="en-US" sz="2800" b="1" i="1">
+            <a:r>
+              <a:rPr lang="en-US" sz="2200" b="1" i="1" dirty="0">
                 <a:solidFill>
                   <a:schemeClr val="tx1">
                     <a:lumMod val="65000"/>
@@ -3492,10 +3455,10 @@
                 <a:ea typeface="Bodoni Std Poster" charset="0"/>
                 <a:cs typeface="Bodoni Std Poster" charset="0"/>
               </a:rPr>
-              <a:t>Fig 2. </a:t>
-            </a:r>
-            <a:r>
-              <a:rPr lang="en-US" sz="2800" b="1" i="1" err="1">
+              <a:t>Fig. 2. F Documentation of the REST </a:t>
+            </a:r>
+            <a:r>
+              <a:rPr lang="en-US" sz="2200" b="1" i="1" dirty="0" err="1">
                 <a:solidFill>
                   <a:schemeClr val="tx1">
                     <a:lumMod val="65000"/>
@@ -3506,10 +3469,10 @@
                 <a:ea typeface="Bodoni Std Poster" charset="0"/>
                 <a:cs typeface="Bodoni Std Poster" charset="0"/>
               </a:rPr>
-              <a:t>FastAPI</a:t>
-            </a:r>
-            <a:r>
-              <a:rPr lang="en-US" sz="2800" b="1" i="1">
+              <a:t>Cloudmesh</a:t>
+            </a:r>
+            <a:r>
+              <a:rPr lang="en-US" sz="2200" b="1" i="1" dirty="0">
                 <a:solidFill>
                   <a:schemeClr val="tx1">
                     <a:lumMod val="65000"/>
@@ -3520,7 +3483,7 @@
                 <a:ea typeface="Bodoni Std Poster" charset="0"/>
                 <a:cs typeface="Bodoni Std Poster" charset="0"/>
               </a:rPr>
-              <a:t> Docs for Workflow</a:t>
+              <a:t> cc Workflow interface</a:t>
             </a:r>
           </a:p>
         </p:txBody>
@@ -3961,7 +3924,7 @@
           </a:p>
           <a:p>
             <a:r>
-              <a:rPr lang="en-US" sz="2200" b="1">
+              <a:rPr lang="en-US" sz="2200" b="1" dirty="0">
                 <a:solidFill>
                   <a:srgbClr val="3A4860"/>
                 </a:solidFill>
@@ -3972,7 +3935,7 @@
               <a:t>The hybrid multi-cloud analytics service framework was created to ensure the optimal user experience for running jobs across many platforms. From the bottom up, there are a plethora of Python objects that were created to ensure execution of the jobs. These are the database, job, graph, and workflow objects along with the frontend service itself. The databases that were produced relied on a previously implemented service called </a:t>
             </a:r>
             <a:r>
-              <a:rPr lang="en-US" sz="2200" b="1" err="1">
+              <a:rPr lang="en-US" sz="2200" b="1" dirty="0" err="1">
                 <a:solidFill>
                   <a:srgbClr val="3A4860"/>
                 </a:solidFill>
@@ -3983,7 +3946,7 @@
               <a:t>YamlDB</a:t>
             </a:r>
             <a:r>
-              <a:rPr lang="en-US" sz="2200" b="1">
+              <a:rPr lang="en-US" sz="2200" b="1" dirty="0">
                 <a:solidFill>
                   <a:srgbClr val="3A4860"/>
                 </a:solidFill>
@@ -4013,10 +3976,10 @@
                 <a:ea typeface="+mn-lt"/>
                 <a:cs typeface="+mn-lt"/>
               </a:rPr>
-              <a:t> </a:t>
-            </a:r>
-            <a:r>
-              <a:rPr lang="en-US" sz="2200" b="1">
+              <a:t> job, and an SSH job (which was primarily used for Rivanna). When a workflow is created, there is an internal structure that identifies the type of machine that is being operated on and creates the correct job based on that machine. After the job, a graph class was created to mesh with the workflow. The graph creates a node and edge graph with a corresponding visual representation of the graph. This was to allow the user to visualize where they are in the workflow. Next the workflow itself allows users to add jobs, remove jobs, add edges, and then run each of the jobs in the order that was specified. This allows the user to interact with each of the previous objects. Finally, the service itself is a </a:t>
+            </a:r>
+            <a:r>
+              <a:rPr lang="en-US" sz="2200" b="1" dirty="0" err="1">
                 <a:solidFill>
                   <a:srgbClr val="3A4860"/>
                 </a:solidFill>
@@ -4024,7 +3987,7 @@
                 <a:ea typeface="+mn-lt"/>
                 <a:cs typeface="+mn-lt"/>
               </a:rPr>
-              <a:t>job, and </a:t>
+              <a:t>FastAPI</a:t>
             </a:r>
             <a:r>
               <a:rPr lang="en-US" sz="2200" b="1" dirty="0">
@@ -4035,10 +3998,10 @@
                 <a:ea typeface="+mn-lt"/>
                 <a:cs typeface="+mn-lt"/>
               </a:rPr>
-              <a:t>an</a:t>
-            </a:r>
-            <a:r>
-              <a:rPr lang="en-US" sz="2200" b="1">
+              <a:t> implementation of the workflow. Users can access this through their own devices, they can add, remove jobs, and run jobs through a graphical user interface. This interface can be run through command line commands as created in the </a:t>
+            </a:r>
+            <a:r>
+              <a:rPr lang="en-US" sz="2200" b="1" dirty="0" err="1">
                 <a:solidFill>
                   <a:srgbClr val="3A4860"/>
                 </a:solidFill>
@@ -4046,10 +4009,10 @@
                 <a:ea typeface="+mn-lt"/>
                 <a:cs typeface="+mn-lt"/>
               </a:rPr>
-              <a:t> SSH job (which was primarily used for Rivanna). When a workflow is created, there is an internal structure that identifies the type of machine that is being operated on and creates the correct job based on that machine. After the job, a graph class was created to mesh with the workflow. The graph creates a node and edge graph with a corresponding visual representation of the graph. This was to allow the user to visualize where they are in the workflow. Next the workflow itself allows users to add jobs, remove jobs, add edges, and then run each of the jobs in the order that was specified. This allows the user to interact with each of the previous objects. Finally, the service itself is a </a:t>
-            </a:r>
-            <a:r>
-              <a:rPr lang="en-US" sz="2200" b="1" err="1">
+              <a:t>cloudmesh</a:t>
+            </a:r>
+            <a:r>
+              <a:rPr lang="en-US" sz="2200" b="1" dirty="0">
                 <a:solidFill>
                   <a:srgbClr val="3A4860"/>
                 </a:solidFill>
@@ -4057,32 +4020,24 @@
                 <a:ea typeface="+mn-lt"/>
                 <a:cs typeface="+mn-lt"/>
               </a:rPr>
-              <a:t>FastAPI</a:t>
-            </a:r>
-            <a:r>
-              <a:rPr lang="en-US" sz="2200" b="1">
-                <a:solidFill>
-                  <a:srgbClr val="3A4860"/>
-                </a:solidFill>
+              <a:t>-cc repository. </a:t>
+            </a:r>
+            <a:br>
+              <a:rPr lang="en-US" sz="2200" b="1" dirty="0">
                 <a:latin typeface="Franklin Gothic Book"/>
                 <a:ea typeface="+mn-lt"/>
                 <a:cs typeface="+mn-lt"/>
               </a:rPr>
-              <a:t> implementation of the workflow. Users can access this through their own devices, they can add, remove jobs, and run jobs through a graphical user interface. This interface can be run through command line commands as created in the </a:t>
-            </a:r>
-            <a:r>
-              <a:rPr lang="en-US" sz="2200" b="1" err="1">
-                <a:solidFill>
-                  <a:srgbClr val="3A4860"/>
-                </a:solidFill>
+            </a:br>
+            <a:br>
+              <a:rPr lang="en-US" sz="2200" b="1" dirty="0">
                 <a:latin typeface="Franklin Gothic Book"/>
                 <a:ea typeface="+mn-lt"/>
                 <a:cs typeface="+mn-lt"/>
               </a:rPr>
-              <a:t>cloudmesh</a:t>
-            </a:r>
-            <a:r>
-              <a:rPr lang="en-US" sz="2200" b="1">
+            </a:br>
+            <a:r>
+              <a:rPr lang="en-US" sz="2200" b="1" dirty="0">
                 <a:solidFill>
                   <a:srgbClr val="3A4860"/>
                 </a:solidFill>
@@ -4090,42 +4045,180 @@
                 <a:ea typeface="+mn-lt"/>
                 <a:cs typeface="+mn-lt"/>
               </a:rPr>
-              <a:t>-cc repository. </a:t>
-            </a:r>
-            <a:br>
-              <a:rPr lang="en-US" sz="2200" b="1">
+              <a:t>In summary, users interact with a graphical user interface to create workflows of jobs, which are scripts that run specific experiments. This graphical user interface shows users where their jobs are in the process of completion and create output files for each job. With this framework, researchers and scientists should be able to create jobs on their own, place them in the workflow, and run them on various types of computers. </a:t>
+            </a:r>
+          </a:p>
+        </p:txBody>
+      </p:sp>
+      <p:sp>
+        <p:nvSpPr>
+          <p:cNvPr id="12" name="TextBox 11">
+            <a:extLst>
+              <a:ext uri="{FF2B5EF4-FFF2-40B4-BE49-F238E27FC236}">
+                <a16:creationId xmlns:a16="http://schemas.microsoft.com/office/drawing/2014/main" id="{7D168A24-73E9-EFAE-8B46-2875103863E6}"/>
+              </a:ext>
+            </a:extLst>
+          </p:cNvPr>
+          <p:cNvSpPr txBox="1"/>
+          <p:nvPr/>
+        </p:nvSpPr>
+        <p:spPr>
+          <a:xfrm>
+            <a:off x="10810471" y="24797112"/>
+            <a:ext cx="10748416" cy="3662541"/>
+          </a:xfrm>
+          <a:prstGeom prst="rect">
+            <a:avLst/>
+          </a:prstGeom>
+          <a:noFill/>
+        </p:spPr>
+        <p:txBody>
+          <a:bodyPr rot="0" spcFirstLastPara="0" vertOverflow="overflow" horzOverflow="overflow" vert="horz" wrap="square" lIns="91440" tIns="45720" rIns="91440" bIns="45720" numCol="1" spcCol="0" rtlCol="0" fromWordArt="0" anchor="t" anchorCtr="0" forceAA="0" compatLnSpc="1">
+            <a:prstTxWarp prst="textNoShape">
+              <a:avLst/>
+            </a:prstTxWarp>
+            <a:spAutoFit/>
+          </a:bodyPr>
+          <a:lstStyle/>
+          <a:p>
+            <a:r>
+              <a:rPr lang="en-US" sz="2400" b="1" dirty="0">
+                <a:solidFill>
+                  <a:srgbClr val="3A4860"/>
+                </a:solidFill>
+                <a:latin typeface="Franklin Gothic"/>
+                <a:ea typeface="+mn-lt"/>
+                <a:cs typeface="+mn-lt"/>
+              </a:rPr>
+              <a:t>Future Work</a:t>
+            </a:r>
+          </a:p>
+          <a:p>
+            <a:r>
+              <a:rPr lang="en-US" sz="2400" dirty="0">
+                <a:solidFill>
+                  <a:srgbClr val="3A4860"/>
+                </a:solidFill>
+                <a:latin typeface="Franklin Gothic"/>
+                <a:ea typeface="+mn-lt"/>
+                <a:cs typeface="+mn-lt"/>
+              </a:rPr>
+              <a:t>The work conducted by the original student team was a pre-alpha prototype and focus was placed on educating the students in teamwork and python programming. In that prototype many design aspects that we set forward at the beginning of the project were not implemented. </a:t>
+            </a:r>
+          </a:p>
+          <a:p>
+            <a:endParaRPr lang="en-US" sz="2400" dirty="0">
+              <a:solidFill>
+                <a:srgbClr val="3A4860"/>
+              </a:solidFill>
+              <a:latin typeface="Franklin Gothic"/>
+              <a:ea typeface="+mn-lt"/>
+              <a:cs typeface="+mn-lt"/>
+            </a:endParaRPr>
+          </a:p>
+          <a:p>
+            <a:r>
+              <a:rPr lang="en-US" sz="2200" b="1" dirty="0">
+                <a:solidFill>
+                  <a:srgbClr val="3A4860"/>
+                </a:solidFill>
                 <a:latin typeface="Franklin Gothic Book"/>
                 <a:ea typeface="+mn-lt"/>
                 <a:cs typeface="+mn-lt"/>
               </a:rPr>
-            </a:br>
-            <a:br>
-              <a:rPr lang="en-US" sz="2200" b="1">
-                <a:latin typeface="Franklin Gothic Book"/>
-                <a:ea typeface="+mn-lt"/>
-                <a:cs typeface="+mn-lt"/>
-              </a:rPr>
-            </a:br>
-            <a:r>
-              <a:rPr lang="en-US" sz="2200" b="1">
-                <a:solidFill>
-                  <a:srgbClr val="3A4860"/>
-                </a:solidFill>
-                <a:latin typeface="Franklin Gothic Book"/>
-                <a:ea typeface="+mn-lt"/>
-                <a:cs typeface="+mn-lt"/>
-              </a:rPr>
-              <a:t>In summary, users interact with a graphical user interface to create workflows of jobs, which are scripts that run specific experiments. This graphical user interface shows users where their jobs are in the process of completion and create output files for each job. With this framework, researchers and scientists should be able to create jobs on their own, place them in the workflow, and run them on various types of computers. </a:t>
+              <a:t>A complete reimplementation that meets our design goals has since been delivered by Gregor von Laszewski and JP. Fleischer. This includes also significant updates  and corrections to this poster </a:t>
+            </a:r>
+          </a:p>
+          <a:p>
+            <a:endParaRPr lang="en-US" sz="2200" b="1" dirty="0">
+              <a:solidFill>
+                <a:srgbClr val="3A4860"/>
+              </a:solidFill>
+              <a:latin typeface="Franklin Gothic Book"/>
+              <a:cs typeface="Calibri"/>
+            </a:endParaRPr>
+          </a:p>
+        </p:txBody>
+      </p:sp>
+      <p:sp>
+        <p:nvSpPr>
+          <p:cNvPr id="23" name="TextBox 22">
+            <a:extLst>
+              <a:ext uri="{FF2B5EF4-FFF2-40B4-BE49-F238E27FC236}">
+                <a16:creationId xmlns:a16="http://schemas.microsoft.com/office/drawing/2014/main" id="{866918AF-1A8A-7BB1-B959-2CE6E1254C05}"/>
+              </a:ext>
+            </a:extLst>
+          </p:cNvPr>
+          <p:cNvSpPr txBox="1"/>
+          <p:nvPr/>
+        </p:nvSpPr>
+        <p:spPr>
+          <a:xfrm>
+            <a:off x="10972800" y="13045739"/>
+            <a:ext cx="10250666" cy="430887"/>
+          </a:xfrm>
+          <a:prstGeom prst="rect">
+            <a:avLst/>
+          </a:prstGeom>
+          <a:noFill/>
+        </p:spPr>
+        <p:txBody>
+          <a:bodyPr wrap="square" rtlCol="0">
+            <a:spAutoFit/>
+          </a:bodyPr>
+          <a:lstStyle/>
+          <a:p>
+            <a:r>
+              <a:rPr lang="en-US" sz="2200" b="1" i="1" dirty="0">
+                <a:solidFill>
+                  <a:schemeClr val="tx1">
+                    <a:lumMod val="65000"/>
+                    <a:lumOff val="35000"/>
+                  </a:schemeClr>
+                </a:solidFill>
+                <a:latin typeface="Bodoni Std Poster" charset="0"/>
+                <a:ea typeface="Bodoni Std Poster" charset="0"/>
+                <a:cs typeface="Bodoni Std Poster" charset="0"/>
+              </a:rPr>
+              <a:t>Fig. 3. Architecture of the </a:t>
+            </a:r>
+            <a:r>
+              <a:rPr lang="en-US" sz="2200" b="1" i="1" dirty="0" err="1">
+                <a:solidFill>
+                  <a:schemeClr val="tx1">
+                    <a:lumMod val="65000"/>
+                    <a:lumOff val="35000"/>
+                  </a:schemeClr>
+                </a:solidFill>
+                <a:latin typeface="Bodoni Std Poster" charset="0"/>
+                <a:ea typeface="Bodoni Std Poster" charset="0"/>
+                <a:cs typeface="Bodoni Std Poster" charset="0"/>
+              </a:rPr>
+              <a:t>Cloudmesh</a:t>
+            </a:r>
+            <a:r>
+              <a:rPr lang="en-US" sz="2200" b="1" i="1" dirty="0">
+                <a:solidFill>
+                  <a:schemeClr val="tx1">
+                    <a:lumMod val="65000"/>
+                    <a:lumOff val="35000"/>
+                  </a:schemeClr>
+                </a:solidFill>
+                <a:latin typeface="Bodoni Std Poster" charset="0"/>
+                <a:ea typeface="Bodoni Std Poster" charset="0"/>
+                <a:cs typeface="Bodoni Std Poster" charset="0"/>
+              </a:rPr>
+              <a:t> cc Workflow Framework</a:t>
             </a:r>
           </a:p>
         </p:txBody>
       </p:sp>
       <p:pic>
         <p:nvPicPr>
-          <p:cNvPr id="6" name="Graphic 7">
+          <p:cNvPr id="5" name="Picture 4">
             <a:extLst>
               <a:ext uri="{FF2B5EF4-FFF2-40B4-BE49-F238E27FC236}">
-                <a16:creationId xmlns:a16="http://schemas.microsoft.com/office/drawing/2014/main" id="{0C228041-6F63-AAC2-0F9E-17E1B2126F47}"/>
+                <a16:creationId xmlns:a16="http://schemas.microsoft.com/office/drawing/2014/main" id="{F7E52BFF-B5E6-1620-B323-E3AC91707404}"/>
               </a:ext>
             </a:extLst>
           </p:cNvPr>
@@ -4135,21 +4228,15 @@
           <p:nvPr/>
         </p:nvPicPr>
         <p:blipFill>
-          <a:blip r:embed="rId7">
-            <a:extLst>
-              <a:ext uri="{96DAC541-7B7A-43D3-8B79-37D633B846F1}">
-                <asvg:svgBlip xmlns:asvg="http://schemas.microsoft.com/office/drawing/2016/SVG/main" r:embed="rId8"/>
-              </a:ext>
-            </a:extLst>
-          </a:blip>
+          <a:blip r:embed="rId7"/>
           <a:stretch>
             <a:fillRect/>
           </a:stretch>
         </p:blipFill>
         <p:spPr>
           <a:xfrm>
-            <a:off x="287684" y="18592865"/>
-            <a:ext cx="4365070" cy="6087824"/>
+            <a:off x="11274351" y="4902620"/>
+            <a:ext cx="9820656" cy="7998802"/>
           </a:xfrm>
           <a:prstGeom prst="rect">
             <a:avLst/>
@@ -4158,10 +4245,10 @@
       </p:pic>
       <p:pic>
         <p:nvPicPr>
-          <p:cNvPr id="9" name="Picture 11" descr="Graphical user interface, application&#10;&#10;Description automatically generated">
+          <p:cNvPr id="11" name="Picture 10" descr="Graphical user interface, application&#10;&#10;Description automatically generated">
             <a:extLst>
               <a:ext uri="{FF2B5EF4-FFF2-40B4-BE49-F238E27FC236}">
-                <a16:creationId xmlns:a16="http://schemas.microsoft.com/office/drawing/2014/main" id="{610C7BE7-060D-F969-F321-8FD3C28CDCA7}"/>
+                <a16:creationId xmlns:a16="http://schemas.microsoft.com/office/drawing/2014/main" id="{60A3AE67-2733-5DF3-FFCF-082A41A9F78B}"/>
               </a:ext>
             </a:extLst>
           </p:cNvPr>
@@ -4170,224 +4257,41 @@
           </p:cNvPicPr>
           <p:nvPr/>
         </p:nvPicPr>
-        <p:blipFill>
-          <a:blip r:embed="rId9"/>
-          <a:stretch>
-            <a:fillRect/>
-          </a:stretch>
+        <p:blipFill rotWithShape="1">
+          <a:blip r:embed="rId8"/>
+          <a:srcRect l="2195" t="3883" r="2195" b="2651"/>
+          <a:stretch/>
         </p:blipFill>
         <p:spPr>
           <a:xfrm>
-            <a:off x="4796947" y="18627678"/>
-            <a:ext cx="5468265" cy="5674820"/>
-          </a:xfrm>
-          <a:prstGeom prst="rect">
-            <a:avLst/>
-          </a:prstGeom>
-          <a:ln w="57150">
-            <a:solidFill>
-              <a:schemeClr val="accent2"/>
-            </a:solidFill>
-          </a:ln>
-        </p:spPr>
-      </p:pic>
-      <p:sp>
-        <p:nvSpPr>
-          <p:cNvPr id="12" name="TextBox 11">
-            <a:extLst>
-              <a:ext uri="{FF2B5EF4-FFF2-40B4-BE49-F238E27FC236}">
-                <a16:creationId xmlns:a16="http://schemas.microsoft.com/office/drawing/2014/main" id="{7D168A24-73E9-EFAE-8B46-2875103863E6}"/>
-              </a:ext>
-            </a:extLst>
-          </p:cNvPr>
-          <p:cNvSpPr txBox="1"/>
-          <p:nvPr/>
-        </p:nvSpPr>
-        <p:spPr>
-          <a:xfrm>
-            <a:off x="10810471" y="24797112"/>
-            <a:ext cx="10748416" cy="4862870"/>
+            <a:off x="4835099" y="18683416"/>
+            <a:ext cx="5330531" cy="5412798"/>
           </a:xfrm>
           <a:prstGeom prst="rect">
             <a:avLst/>
           </a:prstGeom>
           <a:noFill/>
+          <a:ln>
+            <a:noFill/>
+          </a:ln>
+          <a:effectLst/>
+          <a:scene3d>
+            <a:camera prst="orthographicFront"/>
+            <a:lightRig rig="threePt" dir="t"/>
+          </a:scene3d>
+          <a:sp3d contourW="12700">
+            <a:contourClr>
+              <a:schemeClr val="bg1"/>
+            </a:contourClr>
+          </a:sp3d>
         </p:spPr>
-        <p:txBody>
-          <a:bodyPr rot="0" spcFirstLastPara="0" vertOverflow="overflow" horzOverflow="overflow" vert="horz" wrap="square" lIns="91440" tIns="45720" rIns="91440" bIns="45720" numCol="1" spcCol="0" rtlCol="0" fromWordArt="0" anchor="t" anchorCtr="0" forceAA="0" compatLnSpc="1">
-            <a:prstTxWarp prst="textNoShape">
-              <a:avLst/>
-            </a:prstTxWarp>
-            <a:spAutoFit/>
-          </a:bodyPr>
-          <a:lstStyle/>
-          <a:p>
-            <a:r>
-              <a:rPr lang="en-US" sz="2400" b="1" dirty="0">
-                <a:solidFill>
-                  <a:srgbClr val="3A4860"/>
-                </a:solidFill>
-                <a:latin typeface="Franklin Gothic"/>
-                <a:ea typeface="+mn-lt"/>
-                <a:cs typeface="+mn-lt"/>
-              </a:rPr>
-              <a:t>Future Work</a:t>
-            </a:r>
-          </a:p>
-          <a:p>
-            <a:r>
-              <a:rPr lang="en-US" sz="2200" b="1">
-                <a:solidFill>
-                  <a:srgbClr val="3A4860"/>
-                </a:solidFill>
-                <a:latin typeface="Franklin Gothic Book"/>
-                <a:ea typeface="+mn-lt"/>
-                <a:cs typeface="+mn-lt"/>
-              </a:rPr>
-              <a:t>There are a few aspects of the service that are unfinished. For instance, the </a:t>
-            </a:r>
-            <a:r>
-              <a:rPr lang="en-US" sz="2200" b="1" err="1">
-                <a:solidFill>
-                  <a:srgbClr val="3A4860"/>
-                </a:solidFill>
-                <a:latin typeface="Franklin Gothic Book"/>
-                <a:ea typeface="+mn-lt"/>
-                <a:cs typeface="+mn-lt"/>
-              </a:rPr>
-              <a:t>FastAPI</a:t>
-            </a:r>
-            <a:r>
-              <a:rPr lang="en-US" sz="2200" b="1">
-                <a:solidFill>
-                  <a:srgbClr val="3A4860"/>
-                </a:solidFill>
-                <a:latin typeface="Franklin Gothic Book"/>
-                <a:ea typeface="+mn-lt"/>
-                <a:cs typeface="+mn-lt"/>
-              </a:rPr>
-              <a:t> section of the service could be improved to have a more user-friendly graphical interface. This could be accomplished by integrating what we learned through </a:t>
-            </a:r>
-            <a:r>
-              <a:rPr lang="en-US" sz="2200" b="1" err="1">
-                <a:solidFill>
-                  <a:srgbClr val="3A4860"/>
-                </a:solidFill>
-                <a:latin typeface="Franklin Gothic Book"/>
-                <a:ea typeface="+mn-lt"/>
-                <a:cs typeface="+mn-lt"/>
-              </a:rPr>
-              <a:t>FastAPI</a:t>
-            </a:r>
-            <a:r>
-              <a:rPr lang="en-US" sz="2200" b="1">
-                <a:solidFill>
-                  <a:srgbClr val="3A4860"/>
-                </a:solidFill>
-                <a:latin typeface="Franklin Gothic Book"/>
-                <a:ea typeface="+mn-lt"/>
-                <a:cs typeface="+mn-lt"/>
-              </a:rPr>
-              <a:t> with a different frontend framework, such as Django or flask.  </a:t>
-            </a:r>
-          </a:p>
-          <a:p>
-            <a:endParaRPr lang="en-US" sz="2200" b="1">
-              <a:solidFill>
-                <a:srgbClr val="3A4860"/>
-              </a:solidFill>
-              <a:latin typeface="Franklin Gothic Book"/>
-              <a:ea typeface="+mn-lt"/>
-              <a:cs typeface="+mn-lt"/>
-            </a:endParaRPr>
-          </a:p>
-          <a:p>
-            <a:r>
-              <a:rPr lang="en-US" sz="2200" b="1">
-                <a:solidFill>
-                  <a:srgbClr val="3A4860"/>
-                </a:solidFill>
-                <a:latin typeface="Franklin Gothic Book"/>
-                <a:cs typeface="Calibri"/>
-              </a:rPr>
-              <a:t>Regarding the workflow, major cleanup is needed. This could be done by streamlining variables and creating better documentation so future users and programmers can use the service.  </a:t>
-            </a:r>
-          </a:p>
-          <a:p>
-            <a:endParaRPr lang="en-US" sz="2200" b="1">
-              <a:solidFill>
-                <a:srgbClr val="3A4860"/>
-              </a:solidFill>
-              <a:latin typeface="Franklin Gothic Book"/>
-              <a:cs typeface="Calibri"/>
-            </a:endParaRPr>
-          </a:p>
-          <a:p>
-            <a:r>
-              <a:rPr lang="en-US" sz="2200" b="1">
-                <a:solidFill>
-                  <a:srgbClr val="3A4860"/>
-                </a:solidFill>
-                <a:latin typeface="Franklin Gothic Book"/>
-                <a:cs typeface="Calibri"/>
-              </a:rPr>
-              <a:t>With these changes, the service could be vastly improved. In the future, we would like researchers to be able to easily access the code and to have success stories with their experiments. Additionally, we would like external users to report what they found useful and not useful about the service so that we can more craft better solutions in the future. </a:t>
-            </a:r>
-          </a:p>
-        </p:txBody>
-      </p:sp>
-      <p:sp>
-        <p:nvSpPr>
-          <p:cNvPr id="23" name="TextBox 22">
+      </p:pic>
+      <p:pic>
+        <p:nvPicPr>
+          <p:cNvPr id="14" name="Picture 13" descr="Diagram&#10;&#10;Description automatically generated">
             <a:extLst>
               <a:ext uri="{FF2B5EF4-FFF2-40B4-BE49-F238E27FC236}">
-                <a16:creationId xmlns:a16="http://schemas.microsoft.com/office/drawing/2014/main" id="{866918AF-1A8A-7BB1-B959-2CE6E1254C05}"/>
-              </a:ext>
-            </a:extLst>
-          </p:cNvPr>
-          <p:cNvSpPr txBox="1"/>
-          <p:nvPr/>
-        </p:nvSpPr>
-        <p:spPr>
-          <a:xfrm>
-            <a:off x="11901884" y="13045739"/>
-            <a:ext cx="5452915" cy="523220"/>
-          </a:xfrm>
-          <a:prstGeom prst="rect">
-            <a:avLst/>
-          </a:prstGeom>
-          <a:noFill/>
-        </p:spPr>
-        <p:txBody>
-          <a:bodyPr wrap="square" rtlCol="0">
-            <a:spAutoFit/>
-          </a:bodyPr>
-          <a:lstStyle/>
-          <a:p>
-            <a:pPr algn="ctr"/>
-            <a:r>
-              <a:rPr lang="en-US" sz="2800" b="1" i="1">
-                <a:solidFill>
-                  <a:schemeClr val="tx1">
-                    <a:lumMod val="65000"/>
-                    <a:lumOff val="35000"/>
-                  </a:schemeClr>
-                </a:solidFill>
-                <a:latin typeface="Bodoni Std Poster" charset="0"/>
-                <a:ea typeface="Bodoni Std Poster" charset="0"/>
-                <a:cs typeface="Bodoni Std Poster" charset="0"/>
-              </a:rPr>
-              <a:t>Fig 3. Workflow Layout</a:t>
-            </a:r>
-          </a:p>
-        </p:txBody>
-      </p:sp>
-      <p:pic>
-        <p:nvPicPr>
-          <p:cNvPr id="15" name="Picture 14">
-            <a:extLst>
-              <a:ext uri="{FF2B5EF4-FFF2-40B4-BE49-F238E27FC236}">
-                <a16:creationId xmlns:a16="http://schemas.microsoft.com/office/drawing/2014/main" id="{B783B40E-CA1D-720C-E996-3FDE965BC7A7}"/>
+                <a16:creationId xmlns:a16="http://schemas.microsoft.com/office/drawing/2014/main" id="{FC6CB215-1B96-EAD7-EC2A-FB7C33A49D41}"/>
               </a:ext>
             </a:extLst>
           </p:cNvPr>
@@ -4396,25 +4300,29 @@
           </p:cNvPicPr>
           <p:nvPr/>
         </p:nvPicPr>
-        <p:blipFill>
-          <a:blip r:embed="rId10"/>
-          <a:stretch>
-            <a:fillRect/>
-          </a:stretch>
+        <p:blipFill rotWithShape="1">
+          <a:blip r:embed="rId9"/>
+          <a:srcRect l="1720" t="42" r="1077"/>
+          <a:stretch/>
         </p:blipFill>
         <p:spPr>
           <a:xfrm>
-            <a:off x="10968253" y="4511780"/>
-            <a:ext cx="10353492" cy="8448344"/>
+            <a:off x="543697" y="18617514"/>
+            <a:ext cx="3904735" cy="5478700"/>
           </a:xfrm>
           <a:prstGeom prst="rect">
             <a:avLst/>
           </a:prstGeom>
-          <a:ln w="57150">
-            <a:solidFill>
-              <a:schemeClr val="accent2"/>
-            </a:solidFill>
-          </a:ln>
+          <a:effectLst/>
+          <a:scene3d>
+            <a:camera prst="orthographicFront"/>
+            <a:lightRig rig="threePt" dir="t"/>
+          </a:scene3d>
+          <a:sp3d>
+            <a:contourClr>
+              <a:schemeClr val="bg1"/>
+            </a:contourClr>
+          </a:sp3d>
         </p:spPr>
       </p:pic>
     </p:spTree>
@@ -4692,15 +4600,6 @@
 </file>
 
 <file path=customXml/item1.xml><?xml version="1.0" encoding="utf-8"?>
-<?mso-contentType ?>
-<FormTemplates xmlns="http://schemas.microsoft.com/sharepoint/v3/contenttype/forms">
-  <Display>DocumentLibraryForm</Display>
-  <Edit>DocumentLibraryForm</Edit>
-  <New>DocumentLibraryForm</New>
-</FormTemplates>
-</file>
-
-<file path=customXml/item2.xml><?xml version="1.0" encoding="utf-8"?>
 <ct:contentTypeSchema xmlns:ct="http://schemas.microsoft.com/office/2006/metadata/contentType" xmlns:ma="http://schemas.microsoft.com/office/2006/metadata/properties/metaAttributes" ct:_="" ma:_="" ma:contentTypeName="Document" ma:contentTypeID="0x010100D10A93922F8CB14BB5592F4B58469901" ma:contentTypeVersion="0" ma:contentTypeDescription="Create a new document." ma:contentTypeScope="" ma:versionID="3affd054ba839b30da73ab9b0cd67fe0">
   <xsd:schema xmlns:xsd="http://www.w3.org/2001/XMLSchema" xmlns:xs="http://www.w3.org/2001/XMLSchema" xmlns:p="http://schemas.microsoft.com/office/2006/metadata/properties" targetNamespace="http://schemas.microsoft.com/office/2006/metadata/properties" ma:root="true" ma:fieldsID="e10a0a5e1e724a4b2c6304ae1e799d89">
     <xsd:element name="properties">
@@ -4814,6 +4713,15 @@
 </ct:contentTypeSchema>
 </file>
 
+<file path=customXml/item2.xml><?xml version="1.0" encoding="utf-8"?>
+<?mso-contentType ?>
+<FormTemplates xmlns="http://schemas.microsoft.com/sharepoint/v3/contenttype/forms">
+  <Display>DocumentLibraryForm</Display>
+  <Edit>DocumentLibraryForm</Edit>
+  <New>DocumentLibraryForm</New>
+</FormTemplates>
+</file>
+
 <file path=customXml/item3.xml><?xml version="1.0" encoding="utf-8"?>
 <p:properties xmlns:p="http://schemas.microsoft.com/office/2006/metadata/properties" xmlns:xsi="http://www.w3.org/2001/XMLSchema-instance" xmlns:pc="http://schemas.microsoft.com/office/infopath/2007/PartnerControls">
   <documentManagement/>
@@ -4821,14 +4729,6 @@
 </file>
 
 <file path=customXml/itemProps1.xml><?xml version="1.0" encoding="utf-8"?>
-<ds:datastoreItem xmlns:ds="http://schemas.openxmlformats.org/officeDocument/2006/customXml" ds:itemID="{7BC836F9-AC6E-4E5A-ABA8-0AF1AF715A0D}">
-  <ds:schemaRefs>
-    <ds:schemaRef ds:uri="http://schemas.microsoft.com/sharepoint/v3/contenttype/forms"/>
-  </ds:schemaRefs>
-</ds:datastoreItem>
-</file>
-
-<file path=customXml/itemProps2.xml><?xml version="1.0" encoding="utf-8"?>
 <ds:datastoreItem xmlns:ds="http://schemas.openxmlformats.org/officeDocument/2006/customXml" ds:itemID="{F50F1994-0711-4D7D-BB4C-F75D4B491B1D}">
   <ds:schemaRefs>
     <ds:schemaRef ds:uri="http://purl.org/dc/elements/1.1/"/>
@@ -4840,6 +4740,14 @@
     <ds:schemaRef ds:uri="http://schemas.microsoft.com/office/infopath/2007/PartnerControls"/>
     <ds:schemaRef ds:uri="http://schemas.openxmlformats.org/package/2006/metadata/core-properties"/>
     <ds:schemaRef ds:uri="http://www.w3.org/2001/XMLSchema"/>
+  </ds:schemaRefs>
+</ds:datastoreItem>
+</file>
+
+<file path=customXml/itemProps2.xml><?xml version="1.0" encoding="utf-8"?>
+<ds:datastoreItem xmlns:ds="http://schemas.openxmlformats.org/officeDocument/2006/customXml" ds:itemID="{7BC836F9-AC6E-4E5A-ABA8-0AF1AF715A0D}">
+  <ds:schemaRefs>
+    <ds:schemaRef ds:uri="http://schemas.microsoft.com/sharepoint/v3/contenttype/forms"/>
   </ds:schemaRefs>
 </ds:datastoreItem>
 </file>

</xml_diff>

<commit_message>
replace the poster completely as old version and prelpha version was inaccurate and had many factual errors.
</commit_message>
<xml_diff>
--- a/documents/analytics-service.pptx
+++ b/documents/analytics-service.pptx
@@ -3194,7 +3194,7 @@
         </p:nvSpPr>
         <p:spPr>
           <a:xfrm>
-            <a:off x="253574" y="26376702"/>
+            <a:off x="3580259" y="27888047"/>
             <a:ext cx="10353491" cy="2123658"/>
           </a:xfrm>
           <a:prstGeom prst="rect">
@@ -3208,17 +3208,6 @@
           </a:bodyPr>
           <a:lstStyle/>
           <a:p>
-            <a:r>
-              <a:rPr lang="en-US" sz="2400" b="1" dirty="0" err="1">
-                <a:solidFill>
-                  <a:srgbClr val="20304B"/>
-                </a:solidFill>
-                <a:latin typeface="ITC Franklin Gothic Std Demi" charset="0"/>
-                <a:ea typeface="ITC Franklin Gothic Std Demi" charset="0"/>
-                <a:cs typeface="ITC Franklin Gothic Std Demi" charset="0"/>
-              </a:rPr>
-              <a:t>Cloudmesh</a:t>
-            </a:r>
             <a:r>
               <a:rPr lang="en-US" sz="2400" b="1" dirty="0">
                 <a:solidFill>
@@ -3228,7 +3217,7 @@
                 <a:ea typeface="ITC Franklin Gothic Std Demi" charset="0"/>
                 <a:cs typeface="ITC Franklin Gothic Std Demi" charset="0"/>
               </a:rPr>
-              <a:t> References</a:t>
+              <a:t>References</a:t>
             </a:r>
           </a:p>
           <a:p>
@@ -3538,83 +3527,6 @@
               <a:latin typeface="Franklin Gothic Book"/>
               <a:ea typeface="+mn-lt"/>
               <a:cs typeface="+mn-lt"/>
-            </a:endParaRPr>
-          </a:p>
-        </p:txBody>
-      </p:sp>
-      <p:sp>
-        <p:nvSpPr>
-          <p:cNvPr id="12" name="TextBox 11">
-            <a:extLst>
-              <a:ext uri="{FF2B5EF4-FFF2-40B4-BE49-F238E27FC236}">
-                <a16:creationId xmlns:a16="http://schemas.microsoft.com/office/drawing/2014/main" id="{7D168A24-73E9-EFAE-8B46-2875103863E6}"/>
-              </a:ext>
-            </a:extLst>
-          </p:cNvPr>
-          <p:cNvSpPr txBox="1"/>
-          <p:nvPr/>
-        </p:nvSpPr>
-        <p:spPr>
-          <a:xfrm>
-            <a:off x="10810471" y="24404594"/>
-            <a:ext cx="10748416" cy="1815882"/>
-          </a:xfrm>
-          <a:prstGeom prst="rect">
-            <a:avLst/>
-          </a:prstGeom>
-          <a:noFill/>
-        </p:spPr>
-        <p:txBody>
-          <a:bodyPr rot="0" spcFirstLastPara="0" vertOverflow="overflow" horzOverflow="overflow" vert="horz" wrap="square" lIns="91440" tIns="45720" rIns="91440" bIns="45720" numCol="1" spcCol="0" rtlCol="0" fromWordArt="0" anchor="t" anchorCtr="0" forceAA="0" compatLnSpc="1">
-            <a:prstTxWarp prst="textNoShape">
-              <a:avLst/>
-            </a:prstTxWarp>
-            <a:spAutoFit/>
-          </a:bodyPr>
-          <a:lstStyle/>
-          <a:p>
-            <a:r>
-              <a:rPr lang="en-US" sz="2400" b="1" u="sng" dirty="0">
-                <a:solidFill>
-                  <a:schemeClr val="accent1">
-                    <a:lumMod val="50000"/>
-                  </a:schemeClr>
-                </a:solidFill>
-                <a:latin typeface="Franklin Gothic"/>
-                <a:ea typeface="+mn-lt"/>
-                <a:cs typeface="+mn-lt"/>
-              </a:rPr>
-              <a:t>Status of the Work</a:t>
-            </a:r>
-            <a:endParaRPr lang="en-US" sz="2400" b="1" dirty="0">
-              <a:solidFill>
-                <a:srgbClr val="3A4860"/>
-              </a:solidFill>
-              <a:latin typeface="Franklin Gothic"/>
-              <a:ea typeface="+mn-lt"/>
-              <a:cs typeface="+mn-lt"/>
-            </a:endParaRPr>
-          </a:p>
-          <a:p>
-            <a:r>
-              <a:rPr lang="en-US" sz="2200" b="1" dirty="0">
-                <a:solidFill>
-                  <a:srgbClr val="3A4860"/>
-                </a:solidFill>
-                <a:latin typeface="Franklin Gothic Book"/>
-                <a:ea typeface="+mn-lt"/>
-                <a:cs typeface="+mn-lt"/>
-              </a:rPr>
-              <a:t>A complete reimplementation that meets our design goals has since been delivered by Gregor von Laszewski and JP. Fleischer. This includes also significant updates  and corrections to this poster </a:t>
-            </a:r>
-          </a:p>
-          <a:p>
-            <a:endParaRPr lang="en-US" sz="2200" b="1" dirty="0">
-              <a:solidFill>
-                <a:srgbClr val="3A4860"/>
-              </a:solidFill>
-              <a:latin typeface="Franklin Gothic Book"/>
-              <a:cs typeface="Calibri"/>
             </a:endParaRPr>
           </a:p>
         </p:txBody>
@@ -3818,8 +3730,8 @@
         </p:nvSpPr>
         <p:spPr>
           <a:xfrm>
-            <a:off x="10810471" y="26376702"/>
-            <a:ext cx="10748416" cy="2462213"/>
+            <a:off x="10810471" y="23776290"/>
+            <a:ext cx="10748416" cy="3477875"/>
           </a:xfrm>
           <a:prstGeom prst="rect">
             <a:avLst/>
@@ -3855,25 +3767,27 @@
                 <a:ea typeface="+mn-lt"/>
                 <a:cs typeface="+mn-lt"/>
               </a:rPr>
-              <a:t>We like to thank NSF and NIST for supporting this effort</a:t>
-            </a:r>
-            <a:endParaRPr lang="en-US" sz="2200" u="sng" dirty="0">
-              <a:solidFill>
-                <a:schemeClr val="accent1">
-                  <a:lumMod val="50000"/>
-                </a:schemeClr>
-              </a:solidFill>
-              <a:ea typeface="+mn-lt"/>
-              <a:cs typeface="+mn-lt"/>
-            </a:endParaRPr>
-          </a:p>
-          <a:p>
+              <a:t>We like to thank NSF and NIST for supporting this effort.</a:t>
+            </a:r>
+            <a:r>
+              <a:rPr lang="en-US" sz="2200" dirty="0">
+                <a:solidFill>
+                  <a:schemeClr val="accent1">
+                    <a:lumMod val="50000"/>
+                  </a:schemeClr>
+                </a:solidFill>
+                <a:latin typeface="Franklin Gothic"/>
+                <a:ea typeface="+mn-lt"/>
+                <a:cs typeface="+mn-lt"/>
+              </a:rPr>
+              <a:t>  The </a:t>
+            </a:r>
             <a:r>
               <a:rPr lang="en-US" sz="2200" dirty="0">
                 <a:ea typeface="+mn-lt"/>
                 <a:cs typeface="+mn-lt"/>
               </a:rPr>
-              <a:t>In addition to the authors, the pre-alpha version contains contributions from Jackson </a:t>
+              <a:t>pre-alpha version of this effort contains contributions from Jackson </a:t>
             </a:r>
             <a:r>
               <a:rPr lang="en-US" sz="2200" dirty="0" err="1">
@@ -3900,6 +3814,19 @@
               </a:rPr>
               <a:t>The work conducted by the original student team was a pre-alpha prototype and focus was placed on educating the students in teamwork and python programming. In that prototype many design aspects that we set forward at the beginning of the project were not implemented. </a:t>
             </a:r>
+            <a:r>
+              <a:rPr lang="en-US" sz="2200" b="1" dirty="0">
+                <a:solidFill>
+                  <a:srgbClr val="3A4860"/>
+                </a:solidFill>
+                <a:latin typeface="Franklin Gothic Book"/>
+                <a:ea typeface="+mn-lt"/>
+                <a:cs typeface="+mn-lt"/>
+              </a:rPr>
+              <a:t>A complete reimplementation that meets our design goals has since been delivered by Gregor von Laszewski and JP. Fleischer. This includes also significant updates  and corrections to this poster </a:t>
+            </a:r>
+          </a:p>
+          <a:p>
             <a:endParaRPr lang="en-US" sz="2200" dirty="0"/>
           </a:p>
         </p:txBody>

</xml_diff>